<commit_message>
Live Lecture 17 update
</commit_message>
<xml_diff>
--- a/lectures/lecture-17/Lecture-Live/Lecture 17 - Lecture.pptx
+++ b/lectures/lecture-17/Lecture-Live/Lecture 17 - Lecture.pptx
@@ -141,6 +141,198 @@
     </p:ext>
   </p:extLst>
 </p:presentation>
+</file>
+
+<file path=ppt/ink/ink1.xml><?xml version="1.0" encoding="utf-8"?>
+<inkml:ink xmlns:inkml="http://www.w3.org/2003/InkML">
+  <inkml:definitions>
+    <inkml:context xml:id="ctx0">
+      <inkml:inkSource xml:id="inkSrc0">
+        <inkml:traceFormat>
+          <inkml:channel name="X" type="integer" min="-2.14748E9" max="2.14748E9" units="cm"/>
+          <inkml:channel name="Y" type="integer" min="-2.14748E9" max="2.14748E9" units="cm"/>
+          <inkml:channel name="F" type="integer" max="32767" units="dev"/>
+          <inkml:channel name="OA" type="integer" max="360" units="deg"/>
+          <inkml:channel name="OE" type="integer" max="90" units="deg"/>
+        </inkml:traceFormat>
+        <inkml:channelProperties>
+          <inkml:channelProperty channel="X" name="resolution" value="1000" units="1/cm"/>
+          <inkml:channelProperty channel="Y" name="resolution" value="1000" units="1/cm"/>
+          <inkml:channelProperty channel="F" name="resolution" value="0" units="1/dev"/>
+          <inkml:channelProperty channel="OA" name="resolution" value="1000" units="1/deg"/>
+          <inkml:channelProperty channel="OE" name="resolution" value="1000" units="1/deg"/>
+        </inkml:channelProperties>
+      </inkml:inkSource>
+      <inkml:timestamp xml:id="ts0" timeString="2021-05-07T19:00:26.565"/>
+    </inkml:context>
+    <inkml:brush xml:id="br0">
+      <inkml:brushProperty name="width" value="0.05" units="cm"/>
+      <inkml:brushProperty name="height" value="0.05" units="cm"/>
+      <inkml:brushProperty name="color" value="#E71224"/>
+    </inkml:brush>
+  </inkml:definitions>
+  <inkml:trace contextRef="#ctx0" brushRef="#br0">80 279 3680 0 0,'0'0'1299'0'0,"-14"-12"2486"0"0,-13-7-1180 0 0,26 18-2358 0 0,0 0 0 0 0,0 0-1 0 0,0 1 1 0 0,0-1 0 0 0,0 0 0 0 0,-1 1 0 0 0,1-1-1 0 0,0 1 1 0 0,0 0 0 0 0,0-1 0 0 0,-1 1-1 0 0,1 0 1 0 0,0 0 0 0 0,0-1 0 0 0,-1 1 0 0 0,1 0-1 0 0,0 0 1 0 0,-1 1 0 0 0,1-1 0 0 0,-1 0 0 0 0,-11 1 4582 0 0,19 1-4682 0 0,0-1-1 0 0,-1-1 1 0 0,1 1 0 0 0,0-1 0 0 0,0 0 0 0 0,0 0 0 0 0,10-2 0 0 0,14 0 279 0 0,108-8 814 0 0,-54 3-703 0 0,130-4 503 0 0,-101-1-472 0 0,95-6 272 0 0,-26-12-115 0 0,23-2-186 0 0,-99 20-372 0 0,62-3-18 0 0,384-10 640 0 0,-319 23-206 0 0,-125 3-303 0 0,-10 1 72 0 0,-5-1-29 0 0,6 4-38 0 0,-72-10 70 0 0,-26 5-349 0 0,0 0 0 0 0,0 0 0 0 0,0 0 0 0 0,0 0 0 0 0,0-1 0 0 0,0 1 0 0 0,-1 0 0 0 0,1-1 0 0 0,0 1 0 0 0,0 0 1 0 0,0-1-1 0 0,-1 1 0 0 0,1-1 0 0 0,0 1 0 0 0,0-1 0 0 0,-1 0 0 0 0,1 1 0 0 0,-1-1 0 0 0,1 1 0 0 0,0-1 0 0 0,-1 0 0 0 0,1 0 0 0 0,-1 1 1 0 0,0-1-1 0 0,1 0 0 0 0,0-1 0 0 0,5-25-304 0 0,-5 18-44 0 0,-1-6-1530 0 0,0 8-827 0 0</inkml:trace>
+</inkml:ink>
+</file>
+
+<file path=ppt/ink/ink2.xml><?xml version="1.0" encoding="utf-8"?>
+<inkml:ink xmlns:inkml="http://www.w3.org/2003/InkML">
+  <inkml:definitions>
+    <inkml:context xml:id="ctx0">
+      <inkml:inkSource xml:id="inkSrc0">
+        <inkml:traceFormat>
+          <inkml:channel name="X" type="integer" min="-2.14748E9" max="2.14748E9" units="cm"/>
+          <inkml:channel name="Y" type="integer" min="-2.14748E9" max="2.14748E9" units="cm"/>
+          <inkml:channel name="F" type="integer" max="32767" units="dev"/>
+          <inkml:channel name="OA" type="integer" max="360" units="deg"/>
+          <inkml:channel name="OE" type="integer" max="90" units="deg"/>
+        </inkml:traceFormat>
+        <inkml:channelProperties>
+          <inkml:channelProperty channel="X" name="resolution" value="1000" units="1/cm"/>
+          <inkml:channelProperty channel="Y" name="resolution" value="1000" units="1/cm"/>
+          <inkml:channelProperty channel="F" name="resolution" value="0" units="1/dev"/>
+          <inkml:channelProperty channel="OA" name="resolution" value="1000" units="1/deg"/>
+          <inkml:channelProperty channel="OE" name="resolution" value="1000" units="1/deg"/>
+        </inkml:channelProperties>
+      </inkml:inkSource>
+      <inkml:timestamp xml:id="ts0" timeString="2021-05-07T19:00:28.614"/>
+    </inkml:context>
+    <inkml:brush xml:id="br0">
+      <inkml:brushProperty name="width" value="0.05" units="cm"/>
+      <inkml:brushProperty name="height" value="0.05" units="cm"/>
+      <inkml:brushProperty name="color" value="#E71224"/>
+    </inkml:brush>
+  </inkml:definitions>
+  <inkml:trace contextRef="#ctx0" brushRef="#br0">119 68 2760 0 0,'-1'0'59'0'0,"1"-1"-1"0"0,-1 1 1 0 0,1-1-1 0 0,-1 1 1 0 0,1 0-1 0 0,-1-1 1 0 0,1 1 0 0 0,-1 0-1 0 0,1-1 1 0 0,-1 1-1 0 0,0 0 1 0 0,1 0 0 0 0,-1-1-1 0 0,0 1 1 0 0,1 0-1 0 0,-1 0 1 0 0,0 0 0 0 0,1 0-1 0 0,-1 0 1 0 0,0 0-1 0 0,1 0 1 0 0,-1 0 0 0 0,1 0-1 0 0,-1 0 1 0 0,0 0-1 0 0,1 1 1 0 0,-2-1 0 0 0,-11-1 3998 0 0,8-3-3273 0 0,5 3-745 0 0,0 1 0 0 0,-1 0 0 0 0,1-1 0 0 0,0 1 1 0 0,0 0-1 0 0,-1-1 0 0 0,1 1 0 0 0,0 0 0 0 0,-1 0 0 0 0,1-1 0 0 0,-1 1 0 0 0,1 0 0 0 0,0 0 0 0 0,-1 0 0 0 0,1-1 0 0 0,-1 1 0 0 0,1 0 0 0 0,0 0 0 0 0,-1 0 0 0 0,0 0 0 0 0,-1-2 218 0 0,0 1 0 0 0,0-1 0 0 0,0 1 0 0 0,0-1 0 0 0,0 0 0 0 0,1 0 0 0 0,-1 0 0 0 0,1 0 0 0 0,-1 0 0 0 0,0-2 0 0 0,-13-3 1766 0 0,14 7-1847 0 0,0 0 0 0 0,-1-1 0 0 0,1 1 0 0 0,0 0 0 0 0,0 0 1 0 0,0 0-1 0 0,-1 0 0 0 0,1 0 0 0 0,0 0 0 0 0,0 0 1 0 0,-1 0-1 0 0,1 1 0 0 0,0-1 0 0 0,0 0 0 0 0,0 1 1 0 0,0-1-1 0 0,-1 1 0 0 0,1-1 0 0 0,0 1 0 0 0,0 0 0 0 0,-1 1 1 0 0,-11 6 4919 0 0,18-8-3648 0 0,12-1-1950 0 0,-11 1 926 0 0,16-1-140 0 0,26-4-1 0 0,-27 2-91 0 0,-19 3-176 0 0,0 0 0 0 0,1 0 0 0 0,-1 0 1 0 0,1 1-1 0 0,-1-1 0 0 0,0 1 0 0 0,1-1 1 0 0,2 2-1 0 0,-3-1 2 0 0,0-1 0 0 0,0 1 1 0 0,0 0-1 0 0,0-1 0 0 0,1 0 0 0 0,-1 1 0 0 0,0-1 1 0 0,0 0-1 0 0,1 0 0 0 0,2-1 0 0 0,0 0 29 0 0,1 1-1 0 0,-1 0 0 0 0,0 0 1 0 0,1 0-1 0 0,8 2 1 0 0,-8-2 7 0 0,0 1 1 0 0,0-1 0 0 0,1 0-1 0 0,8-1 1 0 0,47-15 281 0 0,-8 8-158 0 0,28-1 36 0 0,123 5 218 0 0,-67 14-310 0 0,-62-4 25 0 0,98-3 0 0 0,23-9 93 0 0,-142 8-120 0 0,88 14 0 0 0,126 17 531 0 0,-54-16-949 0 0,29-9 507 0 0,-83-4 8 0 0,-45-3-128 0 0,67 4 98 0 0,-3 12 259 0 0,-166-15-407 0 0,6 0 241 0 0,0 0 0 0 0,0-1 0 0 0,36-3 0 0 0,-54 1-276 0 0,1 1 1 0 0,0-1-1 0 0,0 0 0 0 0,-1 1 1 0 0,1-1-1 0 0,0-1 0 0 0,-1 1 1 0 0,1 0-1 0 0,-1-1 1 0 0,3-1-1 0 0,-4 2-4 0 0,0 0-1 0 0,1 0 1 0 0,-1-1 0 0 0,0 1 0 0 0,0 0 0 0 0,0 0-1 0 0,-1-1 1 0 0,1 1 0 0 0,0-1 0 0 0,0 1 0 0 0,-1-1-1 0 0,1 1 1 0 0,-1-1 0 0 0,1 1 0 0 0,-1-1 0 0 0,0 1-1 0 0,1-1 1 0 0,-1-3 0 0 0,0 5-187 0 0,0-1 0 0 0,0 0 0 0 0,0 0 1 0 0,0 0-1 0 0,0 0 0 0 0,0 0 0 0 0,-1 1 0 0 0,1-1 0 0 0,0 0 1 0 0,0 0-1 0 0,-1 0 0 0 0,1 1 0 0 0,0-1 0 0 0,-1 0 0 0 0,1 0 0 0 0,-1 1 1 0 0,1-1-1 0 0,-1 0 0 0 0,1 1 0 0 0,-2-2 0 0 0,1 1-74 0 0</inkml:trace>
+</inkml:ink>
+</file>
+
+<file path=ppt/ink/ink3.xml><?xml version="1.0" encoding="utf-8"?>
+<inkml:ink xmlns:inkml="http://www.w3.org/2003/InkML">
+  <inkml:definitions>
+    <inkml:context xml:id="ctx0">
+      <inkml:inkSource xml:id="inkSrc0">
+        <inkml:traceFormat>
+          <inkml:channel name="X" type="integer" min="-2.14748E9" max="2.14748E9" units="cm"/>
+          <inkml:channel name="Y" type="integer" min="-2.14748E9" max="2.14748E9" units="cm"/>
+          <inkml:channel name="F" type="integer" max="32767" units="dev"/>
+          <inkml:channel name="OA" type="integer" max="360" units="deg"/>
+          <inkml:channel name="OE" type="integer" max="90" units="deg"/>
+        </inkml:traceFormat>
+        <inkml:channelProperties>
+          <inkml:channelProperty channel="X" name="resolution" value="1000" units="1/cm"/>
+          <inkml:channelProperty channel="Y" name="resolution" value="1000" units="1/cm"/>
+          <inkml:channelProperty channel="F" name="resolution" value="0" units="1/dev"/>
+          <inkml:channelProperty channel="OA" name="resolution" value="1000" units="1/deg"/>
+          <inkml:channelProperty channel="OE" name="resolution" value="1000" units="1/deg"/>
+        </inkml:channelProperties>
+      </inkml:inkSource>
+      <inkml:timestamp xml:id="ts0" timeString="2021-05-07T19:00:30.408"/>
+    </inkml:context>
+    <inkml:brush xml:id="br0">
+      <inkml:brushProperty name="width" value="0.05" units="cm"/>
+      <inkml:brushProperty name="height" value="0.05" units="cm"/>
+      <inkml:brushProperty name="color" value="#E71224"/>
+    </inkml:brush>
+  </inkml:definitions>
+  <inkml:trace contextRef="#ctx0" brushRef="#br0">135 6 2760 0 0,'0'0'5'0'0,"0"0"1"0"0,0-1-1 0 0,0 1 1 0 0,-1 0-1 0 0,1-1 1 0 0,0 1 0 0 0,0 0-1 0 0,-1-1 1 0 0,1 1-1 0 0,0 0 1 0 0,-1 0-1 0 0,1-1 1 0 0,0 1-1 0 0,-1 0 1 0 0,1 0-1 0 0,0 0 1 0 0,-1-1-1 0 0,1 1 1 0 0,-1 0-1 0 0,1 0 1 0 0,0 0-1 0 0,-1 0 1 0 0,1 0-1 0 0,-1 0 1 0 0,1 0-1 0 0,0 0 1 0 0,-2 0-1 0 0,-9 6 354 0 0,5-1 587 0 0,3-4-32 0 0,-1 1 1 0 0,1-1 0 0 0,0 0-1 0 0,0 0 1 0 0,-1 0 0 0 0,1 0-1 0 0,0-1 1 0 0,-1 1-1 0 0,1-1 1 0 0,-5 0 0 0 0,-20 4 3452 0 0,-5 10 297 0 0,33-14-4589 0 0,-1 0 1 0 0,1 1-1 0 0,0-1 0 0 0,-1 0 0 0 0,1 0 0 0 0,0 1 0 0 0,-1-1 0 0 0,1 0 0 0 0,0 1 1 0 0,-1-1-1 0 0,1 0 0 0 0,0 1 0 0 0,0-1 0 0 0,0 0 0 0 0,-1 1 0 0 0,1-1 0 0 0,0 1 1 0 0,0-1-1 0 0,0 0 0 0 0,0 1 0 0 0,-1-1 0 0 0,1 1 0 0 0,0-1 0 0 0,0 0 0 0 0,0 1 1 0 0,0-1-1 0 0,0 1 0 0 0,0-1 0 0 0,0 1 0 0 0,0-1 0 0 0,0 0 0 0 0,1 1 0 0 0,-1-1 1 0 0,0 1-1 0 0,0-1 0 0 0,0 0 0 0 0,0 1 0 0 0,1-1 0 0 0,-1 1 0 0 0,0-1 0 0 0,0 0 1 0 0,1 1-1 0 0,-1-1 0 0 0,0 0 0 0 0,1 1 0 0 0,-1-1 0 0 0,0 0 0 0 0,1 1 0 0 0,16 12 680 0 0,-5-9-608 0 0,-1 0 0 0 0,1-1 0 0 0,0 0-1 0 0,1 0 1 0 0,16 0 0 0 0,64-1 367 0 0,-33-3-273 0 0,139 8 323 0 0,154 2 840 0 0,189-29-528 0 0,-512 19-756 0 0,151-16 197 0 0,-120 10-222 0 0,91-14-87 0 0,-132 16-8 0 0,-17 1 0 0 0,2 1 0 0 0,-4 2-265 0 0,-1 1 1 0 0,1-1-1 0 0,-1 0 1 0 0,1 1-1 0 0,-1-1 1 0 0,0 1-1 0 0,1-1 1 0 0,-1 0-1 0 0,1 1 1 0 0,-1-1-1 0 0,0 0 1 0 0,0 0-1 0 0,1 1 1 0 0,-1-1-1 0 0,0 0 1 0 0,0 0-1 0 0,0-1 1 0 0,1-1-1580 0 0,1-3 177 0 0</inkml:trace>
+</inkml:ink>
+</file>
+
+<file path=ppt/ink/ink4.xml><?xml version="1.0" encoding="utf-8"?>
+<inkml:ink xmlns:inkml="http://www.w3.org/2003/InkML">
+  <inkml:definitions>
+    <inkml:context xml:id="ctx0">
+      <inkml:inkSource xml:id="inkSrc0">
+        <inkml:traceFormat>
+          <inkml:channel name="X" type="integer" min="-2.14748E9" max="2.14748E9" units="cm"/>
+          <inkml:channel name="Y" type="integer" min="-2.14748E9" max="2.14748E9" units="cm"/>
+          <inkml:channel name="F" type="integer" max="32767" units="dev"/>
+          <inkml:channel name="OA" type="integer" max="360" units="deg"/>
+          <inkml:channel name="OE" type="integer" max="90" units="deg"/>
+        </inkml:traceFormat>
+        <inkml:channelProperties>
+          <inkml:channelProperty channel="X" name="resolution" value="1000" units="1/cm"/>
+          <inkml:channelProperty channel="Y" name="resolution" value="1000" units="1/cm"/>
+          <inkml:channelProperty channel="F" name="resolution" value="0" units="1/dev"/>
+          <inkml:channelProperty channel="OA" name="resolution" value="1000" units="1/deg"/>
+          <inkml:channelProperty channel="OE" name="resolution" value="1000" units="1/deg"/>
+        </inkml:channelProperties>
+      </inkml:inkSource>
+      <inkml:timestamp xml:id="ts0" timeString="2021-05-07T19:00:33.367"/>
+    </inkml:context>
+    <inkml:brush xml:id="br0">
+      <inkml:brushProperty name="width" value="0.05" units="cm"/>
+      <inkml:brushProperty name="height" value="0.05" units="cm"/>
+      <inkml:brushProperty name="color" value="#E71224"/>
+    </inkml:brush>
+  </inkml:definitions>
+  <inkml:trace contextRef="#ctx0" brushRef="#br0">205 54 2304 0 0,'-1'-1'11'0'0,"1"0"1"0"0,-1 0-1 0 0,0 0 0 0 0,0 1 1 0 0,0-1-1 0 0,0 0 0 0 0,-1 1 1 0 0,1-1-1 0 0,0 0 0 0 0,0 1 1 0 0,0-1-1 0 0,-1 1 0 0 0,1 0 1 0 0,0-1-1 0 0,0 1 0 0 0,-1 0 1 0 0,1 0-1 0 0,0 0 0 0 0,0 0 0 0 0,-1 0 1 0 0,0 0-1 0 0,-11-1 257 0 0,-17-3 5291 0 0,4 0-2252 0 0,-34 0 0 0 0,58 4-3116 0 0,-1 1 0 0 0,0-1-1 0 0,0 1 1 0 0,0 0 0 0 0,0 0-1 0 0,-2 1 1 0 0,-12 3 1497 0 0,7-5 2182 0 0,72 19-1421 0 0,-41-12-1929 0 0,36 9-1 0 0,25-4 42 0 0,0-3-1 0 0,1-4 1 0 0,-1-3-1 0 0,138-15 1 0 0,51-13 440 0 0,-218 22-765 0 0,445-14 907 0 0,-437 20-1026 0 0,120 7 671 0 0,-29-10-564 0 0,42-22-171 0 0,-95 9-34 0 0,31 3-19 0 0,-120 12 123 0 0,-8-1-85 0 0,0 0 0 0 0,-1 0-1 0 0,1 0 1 0 0,0 0-1 0 0,-1 0 1 0 0,1 0-1 0 0,-1 0 1 0 0,1-1-1 0 0,0 1 1 0 0,-1-1-1 0 0,1 1 1 0 0,-1-1 0 0 0,1 0-1 0 0,-1 1 1 0 0,1-1-1 0 0,-1 0 1 0 0,1 0-1 0 0,-1 0 1 0 0,0 0-1 0 0,2-2 1 0 0,-2 2-535 0 0</inkml:trace>
+</inkml:ink>
+</file>
+
+<file path=ppt/ink/ink5.xml><?xml version="1.0" encoding="utf-8"?>
+<inkml:ink xmlns:inkml="http://www.w3.org/2003/InkML">
+  <inkml:definitions>
+    <inkml:context xml:id="ctx0">
+      <inkml:inkSource xml:id="inkSrc0">
+        <inkml:traceFormat>
+          <inkml:channel name="X" type="integer" min="-2.14748E9" max="2.14748E9" units="cm"/>
+          <inkml:channel name="Y" type="integer" min="-2.14748E9" max="2.14748E9" units="cm"/>
+          <inkml:channel name="F" type="integer" max="32767" units="dev"/>
+          <inkml:channel name="OA" type="integer" max="360" units="deg"/>
+          <inkml:channel name="OE" type="integer" max="90" units="deg"/>
+        </inkml:traceFormat>
+        <inkml:channelProperties>
+          <inkml:channelProperty channel="X" name="resolution" value="1000" units="1/cm"/>
+          <inkml:channelProperty channel="Y" name="resolution" value="1000" units="1/cm"/>
+          <inkml:channelProperty channel="F" name="resolution" value="0" units="1/dev"/>
+          <inkml:channelProperty channel="OA" name="resolution" value="1000" units="1/deg"/>
+          <inkml:channelProperty channel="OE" name="resolution" value="1000" units="1/deg"/>
+        </inkml:channelProperties>
+      </inkml:inkSource>
+      <inkml:timestamp xml:id="ts0" timeString="2021-05-07T19:00:36.542"/>
+    </inkml:context>
+    <inkml:brush xml:id="br0">
+      <inkml:brushProperty name="width" value="0.05" units="cm"/>
+      <inkml:brushProperty name="height" value="0.05" units="cm"/>
+      <inkml:brushProperty name="color" value="#E71224"/>
+    </inkml:brush>
+  </inkml:definitions>
+  <inkml:trace contextRef="#ctx0" brushRef="#br0">46 104 4144 0 0,'-15'-2'440'0'0,"-15"3"17607"0"0,89-10-15249 0 0,-16 4-2453 0 0,52 0 0 0 0,118 20 210 0 0,-37 0 146 0 0,-109-12-602 0 0,55 1-78 0 0,-93-4-4 0 0,328-12 1062 0 0,4-38-383 0 0,-243 32-472 0 0,-62 13-67 0 0,2 1-1 0 0,85 8 0 0 0,-52-5 279 0 0,-37 0 45 0 0,-49 1-412 0 0,-3 1 12 0 0,0-1 1 0 0,0 0 0 0 0,0 0 0 0 0,0 0 0 0 0,1-1 0 0 0,-1 1 0 0 0,0 0 0 0 0,3-2 0 0 0,-2-3-58 0 0,5-4-5451 0 0,18-9-2932 0 0</inkml:trace>
+</inkml:ink>
+</file>
+
+<file path=ppt/ink/ink6.xml><?xml version="1.0" encoding="utf-8"?>
+<inkml:ink xmlns:inkml="http://www.w3.org/2003/InkML">
+  <inkml:definitions>
+    <inkml:context xml:id="ctx0">
+      <inkml:inkSource xml:id="inkSrc0">
+        <inkml:traceFormat>
+          <inkml:channel name="X" type="integer" min="-2.14748E9" max="2.14748E9" units="cm"/>
+          <inkml:channel name="Y" type="integer" min="-2.14748E9" max="2.14748E9" units="cm"/>
+          <inkml:channel name="F" type="integer" max="32767" units="dev"/>
+          <inkml:channel name="OA" type="integer" max="360" units="deg"/>
+          <inkml:channel name="OE" type="integer" max="90" units="deg"/>
+        </inkml:traceFormat>
+        <inkml:channelProperties>
+          <inkml:channelProperty channel="X" name="resolution" value="1000" units="1/cm"/>
+          <inkml:channelProperty channel="Y" name="resolution" value="1000" units="1/cm"/>
+          <inkml:channelProperty channel="F" name="resolution" value="0" units="1/dev"/>
+          <inkml:channelProperty channel="OA" name="resolution" value="1000" units="1/deg"/>
+          <inkml:channelProperty channel="OE" name="resolution" value="1000" units="1/deg"/>
+        </inkml:channelProperties>
+      </inkml:inkSource>
+      <inkml:timestamp xml:id="ts0" timeString="2021-05-07T19:00:37.858"/>
+    </inkml:context>
+    <inkml:brush xml:id="br0">
+      <inkml:brushProperty name="width" value="0.05" units="cm"/>
+      <inkml:brushProperty name="height" value="0.05" units="cm"/>
+      <inkml:brushProperty name="color" value="#E71224"/>
+    </inkml:brush>
+  </inkml:definitions>
+  <inkml:trace contextRef="#ctx0" brushRef="#br0">52 76 9440 0 0,'0'0'432'0'0,"-8"-5"160"0"0,5 4 106 0 0,1 0 0 0 0,-1-1 0 0 0,1 1 0 0 0,0-1 0 0 0,0 1 0 0 0,-1-1 0 0 0,1 0 0 0 0,0 0 0 0 0,-3-4 0 0 0,-6-5 3132 0 0,10 11-3596 0 0,1-1-1 0 0,-1 0 1 0 0,1 1-1 0 0,-1-1 1 0 0,1 0 0 0 0,-1 1-1 0 0,1-1 1 0 0,0 0-1 0 0,-1 1 1 0 0,1-1 0 0 0,0 0-1 0 0,-1 0 1 0 0,1 0-1 0 0,0 1 1 0 0,0-1 0 0 0,0 0-1 0 0,0 0 1 0 0,0 0-1 0 0,0 0 1 0 0,0 1 0 0 0,0-3-1 0 0,0 1 147 0 0,0 1 17 0 0,12-7 835 0 0,-4 6-1170 0 0,1-1 0 0 0,-1 2-1 0 0,0-1 1 0 0,1 1 0 0 0,16 0 0 0 0,45 4 287 0 0,-55-1-332 0 0,225 12 434 0 0,49-8-331 0 0,-105-1 191 0 0,66 4 95 0 0,-94 0-198 0 0,124 12 544 0 0,-195-13-774 0 0,0-4 1 0 0,86-8-1 0 0,-92 2 327 0 0,163-23 317 0 0,-39 3-209 0 0,-156 19-438 0 0,109-10-65 0 0,-134 8 90 0 0</inkml:trace>
+</inkml:ink>
 </file>
 
 <file path=ppt/notesMasters/notesMaster1.xml><?xml version="1.0" encoding="utf-8"?>
@@ -4183,6 +4375,312 @@
           </a:p>
         </p:txBody>
       </p:sp>
+      <mc:AlternateContent xmlns:mc="http://schemas.openxmlformats.org/markup-compatibility/2006">
+        <mc:Choice xmlns:p14="http://schemas.microsoft.com/office/powerpoint/2010/main" Requires="p14">
+          <p:contentPart p14:bwMode="auto" r:id="rId2">
+            <p14:nvContentPartPr>
+              <p14:cNvPr id="4" name="Ink 3">
+                <a:extLst>
+                  <a:ext uri="{FF2B5EF4-FFF2-40B4-BE49-F238E27FC236}">
+                    <a16:creationId xmlns:a16="http://schemas.microsoft.com/office/drawing/2014/main" id="{12B069C3-43C2-4D9F-B76E-C9098F7F762D}"/>
+                  </a:ext>
+                </a:extLst>
+              </p14:cNvPr>
+              <p14:cNvContentPartPr/>
+              <p14:nvPr/>
+            </p14:nvContentPartPr>
+            <p14:xfrm>
+              <a:off x="2179369" y="1662379"/>
+              <a:ext cx="987480" cy="100800"/>
+            </p14:xfrm>
+          </p:contentPart>
+        </mc:Choice>
+        <mc:Fallback>
+          <p:pic>
+            <p:nvPicPr>
+              <p:cNvPr id="4" name="Ink 3">
+                <a:extLst>
+                  <a:ext uri="{FF2B5EF4-FFF2-40B4-BE49-F238E27FC236}">
+                    <a16:creationId xmlns:a16="http://schemas.microsoft.com/office/drawing/2014/main" id="{12B069C3-43C2-4D9F-B76E-C9098F7F762D}"/>
+                  </a:ext>
+                </a:extLst>
+              </p:cNvPr>
+              <p:cNvPicPr/>
+              <p:nvPr/>
+            </p:nvPicPr>
+            <p:blipFill>
+              <a:blip r:embed="rId3"/>
+              <a:stretch>
+                <a:fillRect/>
+              </a:stretch>
+            </p:blipFill>
+            <p:spPr>
+              <a:xfrm>
+                <a:off x="2170369" y="1653379"/>
+                <a:ext cx="1005120" cy="118440"/>
+              </a:xfrm>
+              <a:prstGeom prst="rect">
+                <a:avLst/>
+              </a:prstGeom>
+            </p:spPr>
+          </p:pic>
+        </mc:Fallback>
+      </mc:AlternateContent>
+      <mc:AlternateContent xmlns:mc="http://schemas.openxmlformats.org/markup-compatibility/2006">
+        <mc:Choice xmlns:p14="http://schemas.microsoft.com/office/powerpoint/2010/main" Requires="p14">
+          <p:contentPart p14:bwMode="auto" r:id="rId4">
+            <p14:nvContentPartPr>
+              <p14:cNvPr id="5" name="Ink 4">
+                <a:extLst>
+                  <a:ext uri="{FF2B5EF4-FFF2-40B4-BE49-F238E27FC236}">
+                    <a16:creationId xmlns:a16="http://schemas.microsoft.com/office/drawing/2014/main" id="{F3C6EB4D-5583-43B5-8B9A-36930D6291B3}"/>
+                  </a:ext>
+                </a:extLst>
+              </p14:cNvPr>
+              <p14:cNvContentPartPr/>
+              <p14:nvPr/>
+            </p14:nvContentPartPr>
+            <p14:xfrm>
+              <a:off x="1850329" y="2115979"/>
+              <a:ext cx="1073160" cy="44640"/>
+            </p14:xfrm>
+          </p:contentPart>
+        </mc:Choice>
+        <mc:Fallback>
+          <p:pic>
+            <p:nvPicPr>
+              <p:cNvPr id="5" name="Ink 4">
+                <a:extLst>
+                  <a:ext uri="{FF2B5EF4-FFF2-40B4-BE49-F238E27FC236}">
+                    <a16:creationId xmlns:a16="http://schemas.microsoft.com/office/drawing/2014/main" id="{F3C6EB4D-5583-43B5-8B9A-36930D6291B3}"/>
+                  </a:ext>
+                </a:extLst>
+              </p:cNvPr>
+              <p:cNvPicPr/>
+              <p:nvPr/>
+            </p:nvPicPr>
+            <p:blipFill>
+              <a:blip r:embed="rId5"/>
+              <a:stretch>
+                <a:fillRect/>
+              </a:stretch>
+            </p:blipFill>
+            <p:spPr>
+              <a:xfrm>
+                <a:off x="1841329" y="2106979"/>
+                <a:ext cx="1090800" cy="62280"/>
+              </a:xfrm>
+              <a:prstGeom prst="rect">
+                <a:avLst/>
+              </a:prstGeom>
+            </p:spPr>
+          </p:pic>
+        </mc:Fallback>
+      </mc:AlternateContent>
+      <mc:AlternateContent xmlns:mc="http://schemas.openxmlformats.org/markup-compatibility/2006">
+        <mc:Choice xmlns:p14="http://schemas.microsoft.com/office/powerpoint/2010/main" Requires="p14">
+          <p:contentPart p14:bwMode="auto" r:id="rId6">
+            <p14:nvContentPartPr>
+              <p14:cNvPr id="6" name="Ink 5">
+                <a:extLst>
+                  <a:ext uri="{FF2B5EF4-FFF2-40B4-BE49-F238E27FC236}">
+                    <a16:creationId xmlns:a16="http://schemas.microsoft.com/office/drawing/2014/main" id="{ADCEF538-6BFA-4D07-99E8-E6188FD24228}"/>
+                  </a:ext>
+                </a:extLst>
+              </p14:cNvPr>
+              <p14:cNvContentPartPr/>
+              <p14:nvPr/>
+            </p14:nvContentPartPr>
+            <p14:xfrm>
+              <a:off x="4504969" y="2147299"/>
+              <a:ext cx="655200" cy="38520"/>
+            </p14:xfrm>
+          </p:contentPart>
+        </mc:Choice>
+        <mc:Fallback>
+          <p:pic>
+            <p:nvPicPr>
+              <p:cNvPr id="6" name="Ink 5">
+                <a:extLst>
+                  <a:ext uri="{FF2B5EF4-FFF2-40B4-BE49-F238E27FC236}">
+                    <a16:creationId xmlns:a16="http://schemas.microsoft.com/office/drawing/2014/main" id="{ADCEF538-6BFA-4D07-99E8-E6188FD24228}"/>
+                  </a:ext>
+                </a:extLst>
+              </p:cNvPr>
+              <p:cNvPicPr/>
+              <p:nvPr/>
+            </p:nvPicPr>
+            <p:blipFill>
+              <a:blip r:embed="rId7"/>
+              <a:stretch>
+                <a:fillRect/>
+              </a:stretch>
+            </p:blipFill>
+            <p:spPr>
+              <a:xfrm>
+                <a:off x="4495969" y="2138659"/>
+                <a:ext cx="672840" cy="56160"/>
+              </a:xfrm>
+              <a:prstGeom prst="rect">
+                <a:avLst/>
+              </a:prstGeom>
+            </p:spPr>
+          </p:pic>
+        </mc:Fallback>
+      </mc:AlternateContent>
+      <mc:AlternateContent xmlns:mc="http://schemas.openxmlformats.org/markup-compatibility/2006">
+        <mc:Choice xmlns:p14="http://schemas.microsoft.com/office/powerpoint/2010/main" Requires="p14">
+          <p:contentPart p14:bwMode="auto" r:id="rId8">
+            <p14:nvContentPartPr>
+              <p14:cNvPr id="7" name="Ink 6">
+                <a:extLst>
+                  <a:ext uri="{FF2B5EF4-FFF2-40B4-BE49-F238E27FC236}">
+                    <a16:creationId xmlns:a16="http://schemas.microsoft.com/office/drawing/2014/main" id="{7B12946C-4CE9-4D8B-8504-548E2164B522}"/>
+                  </a:ext>
+                </a:extLst>
+              </p14:cNvPr>
+              <p14:cNvContentPartPr/>
+              <p14:nvPr/>
+            </p14:nvContentPartPr>
+            <p14:xfrm>
+              <a:off x="2311849" y="2587219"/>
+              <a:ext cx="855000" cy="40320"/>
+            </p14:xfrm>
+          </p:contentPart>
+        </mc:Choice>
+        <mc:Fallback>
+          <p:pic>
+            <p:nvPicPr>
+              <p:cNvPr id="7" name="Ink 6">
+                <a:extLst>
+                  <a:ext uri="{FF2B5EF4-FFF2-40B4-BE49-F238E27FC236}">
+                    <a16:creationId xmlns:a16="http://schemas.microsoft.com/office/drawing/2014/main" id="{7B12946C-4CE9-4D8B-8504-548E2164B522}"/>
+                  </a:ext>
+                </a:extLst>
+              </p:cNvPr>
+              <p:cNvPicPr/>
+              <p:nvPr/>
+            </p:nvPicPr>
+            <p:blipFill>
+              <a:blip r:embed="rId9"/>
+              <a:stretch>
+                <a:fillRect/>
+              </a:stretch>
+            </p:blipFill>
+            <p:spPr>
+              <a:xfrm>
+                <a:off x="2303209" y="2578579"/>
+                <a:ext cx="872640" cy="57960"/>
+              </a:xfrm>
+              <a:prstGeom prst="rect">
+                <a:avLst/>
+              </a:prstGeom>
+            </p:spPr>
+          </p:pic>
+        </mc:Fallback>
+      </mc:AlternateContent>
+      <mc:AlternateContent xmlns:mc="http://schemas.openxmlformats.org/markup-compatibility/2006">
+        <mc:Choice xmlns:p14="http://schemas.microsoft.com/office/powerpoint/2010/main" Requires="p14">
+          <p:contentPart p14:bwMode="auto" r:id="rId10">
+            <p14:nvContentPartPr>
+              <p14:cNvPr id="8" name="Ink 7">
+                <a:extLst>
+                  <a:ext uri="{FF2B5EF4-FFF2-40B4-BE49-F238E27FC236}">
+                    <a16:creationId xmlns:a16="http://schemas.microsoft.com/office/drawing/2014/main" id="{4204DCD3-2654-44B4-BEF3-A44CCF48CE76}"/>
+                  </a:ext>
+                </a:extLst>
+              </p14:cNvPr>
+              <p14:cNvContentPartPr/>
+              <p14:nvPr/>
+            </p14:nvContentPartPr>
+            <p14:xfrm>
+              <a:off x="875809" y="2988259"/>
+              <a:ext cx="758880" cy="43920"/>
+            </p14:xfrm>
+          </p:contentPart>
+        </mc:Choice>
+        <mc:Fallback>
+          <p:pic>
+            <p:nvPicPr>
+              <p:cNvPr id="8" name="Ink 7">
+                <a:extLst>
+                  <a:ext uri="{FF2B5EF4-FFF2-40B4-BE49-F238E27FC236}">
+                    <a16:creationId xmlns:a16="http://schemas.microsoft.com/office/drawing/2014/main" id="{4204DCD3-2654-44B4-BEF3-A44CCF48CE76}"/>
+                  </a:ext>
+                </a:extLst>
+              </p:cNvPr>
+              <p:cNvPicPr/>
+              <p:nvPr/>
+            </p:nvPicPr>
+            <p:blipFill>
+              <a:blip r:embed="rId11"/>
+              <a:stretch>
+                <a:fillRect/>
+              </a:stretch>
+            </p:blipFill>
+            <p:spPr>
+              <a:xfrm>
+                <a:off x="867169" y="2979259"/>
+                <a:ext cx="776520" cy="61560"/>
+              </a:xfrm>
+              <a:prstGeom prst="rect">
+                <a:avLst/>
+              </a:prstGeom>
+            </p:spPr>
+          </p:pic>
+        </mc:Fallback>
+      </mc:AlternateContent>
+      <mc:AlternateContent xmlns:mc="http://schemas.openxmlformats.org/markup-compatibility/2006">
+        <mc:Choice xmlns:p14="http://schemas.microsoft.com/office/powerpoint/2010/main" Requires="p14">
+          <p:contentPart p14:bwMode="auto" r:id="rId12">
+            <p14:nvContentPartPr>
+              <p14:cNvPr id="9" name="Ink 8">
+                <a:extLst>
+                  <a:ext uri="{FF2B5EF4-FFF2-40B4-BE49-F238E27FC236}">
+                    <a16:creationId xmlns:a16="http://schemas.microsoft.com/office/drawing/2014/main" id="{38761C5B-F243-4853-A332-A57ABA1B4BEC}"/>
+                  </a:ext>
+                </a:extLst>
+              </p14:cNvPr>
+              <p14:cNvContentPartPr/>
+              <p14:nvPr/>
+            </p14:nvContentPartPr>
+            <p14:xfrm>
+              <a:off x="4074409" y="2982139"/>
+              <a:ext cx="955440" cy="29520"/>
+            </p14:xfrm>
+          </p:contentPart>
+        </mc:Choice>
+        <mc:Fallback>
+          <p:pic>
+            <p:nvPicPr>
+              <p:cNvPr id="9" name="Ink 8">
+                <a:extLst>
+                  <a:ext uri="{FF2B5EF4-FFF2-40B4-BE49-F238E27FC236}">
+                    <a16:creationId xmlns:a16="http://schemas.microsoft.com/office/drawing/2014/main" id="{38761C5B-F243-4853-A332-A57ABA1B4BEC}"/>
+                  </a:ext>
+                </a:extLst>
+              </p:cNvPr>
+              <p:cNvPicPr/>
+              <p:nvPr/>
+            </p:nvPicPr>
+            <p:blipFill>
+              <a:blip r:embed="rId13"/>
+              <a:stretch>
+                <a:fillRect/>
+              </a:stretch>
+            </p:blipFill>
+            <p:spPr>
+              <a:xfrm>
+                <a:off x="4065769" y="2973499"/>
+                <a:ext cx="973080" cy="47160"/>
+              </a:xfrm>
+              <a:prstGeom prst="rect">
+                <a:avLst/>
+              </a:prstGeom>
+            </p:spPr>
+          </p:pic>
+        </mc:Fallback>
+      </mc:AlternateContent>
     </p:spTree>
     <p:extLst>
       <p:ext uri="{BB962C8B-B14F-4D97-AF65-F5344CB8AC3E}">

</xml_diff>